<commit_message>
implemented maps activity and functionality of sending emails to both users
</commit_message>
<xml_diff>
--- a/CAR POOL.pptx
+++ b/CAR POOL.pptx
@@ -11,6 +11,13 @@
     <p:sldId id="259" r:id="rId5"/>
     <p:sldId id="260" r:id="rId6"/>
     <p:sldId id="261" r:id="rId7"/>
+    <p:sldId id="262" r:id="rId8"/>
+    <p:sldId id="263" r:id="rId9"/>
+    <p:sldId id="264" r:id="rId10"/>
+    <p:sldId id="265" r:id="rId11"/>
+    <p:sldId id="266" r:id="rId12"/>
+    <p:sldId id="267" r:id="rId13"/>
+    <p:sldId id="268" r:id="rId14"/>
   </p:sldIdLst>
   <p:sldSz cx="9144000" cy="6858000" type="screen4x3"/>
   <p:notesSz cx="6858000" cy="9144000"/>
@@ -293,6 +300,7 @@
           <a:p>
             <a:fld id="{5C91B516-820E-4688-AFA5-AAF86CC8F7E6}" type="datetimeFigureOut">
               <a:rPr lang="en-US" smtClean="0"/>
+              <a:pPr/>
               <a:t>8/8/2016</a:t>
             </a:fld>
             <a:endParaRPr lang="en-US"/>
@@ -335,6 +343,7 @@
           <a:p>
             <a:fld id="{694BE614-E7CF-41F8-AE74-BA270906C318}" type="slidenum">
               <a:rPr lang="en-US" smtClean="0"/>
+              <a:pPr/>
               <a:t>‹#›</a:t>
             </a:fld>
             <a:endParaRPr lang="en-US"/>
@@ -458,6 +467,7 @@
           <a:p>
             <a:fld id="{5C91B516-820E-4688-AFA5-AAF86CC8F7E6}" type="datetimeFigureOut">
               <a:rPr lang="en-US" smtClean="0"/>
+              <a:pPr/>
               <a:t>8/8/2016</a:t>
             </a:fld>
             <a:endParaRPr lang="en-US"/>
@@ -500,6 +510,7 @@
           <a:p>
             <a:fld id="{694BE614-E7CF-41F8-AE74-BA270906C318}" type="slidenum">
               <a:rPr lang="en-US" smtClean="0"/>
+              <a:pPr/>
               <a:t>‹#›</a:t>
             </a:fld>
             <a:endParaRPr lang="en-US"/>
@@ -633,6 +644,7 @@
           <a:p>
             <a:fld id="{5C91B516-820E-4688-AFA5-AAF86CC8F7E6}" type="datetimeFigureOut">
               <a:rPr lang="en-US" smtClean="0"/>
+              <a:pPr/>
               <a:t>8/8/2016</a:t>
             </a:fld>
             <a:endParaRPr lang="en-US"/>
@@ -675,6 +687,7 @@
           <a:p>
             <a:fld id="{694BE614-E7CF-41F8-AE74-BA270906C318}" type="slidenum">
               <a:rPr lang="en-US" smtClean="0"/>
+              <a:pPr/>
               <a:t>‹#›</a:t>
             </a:fld>
             <a:endParaRPr lang="en-US"/>
@@ -798,6 +811,7 @@
           <a:p>
             <a:fld id="{5C91B516-820E-4688-AFA5-AAF86CC8F7E6}" type="datetimeFigureOut">
               <a:rPr lang="en-US" smtClean="0"/>
+              <a:pPr/>
               <a:t>8/8/2016</a:t>
             </a:fld>
             <a:endParaRPr lang="en-US"/>
@@ -840,6 +854,7 @@
           <a:p>
             <a:fld id="{694BE614-E7CF-41F8-AE74-BA270906C318}" type="slidenum">
               <a:rPr lang="en-US" smtClean="0"/>
+              <a:pPr/>
               <a:t>‹#›</a:t>
             </a:fld>
             <a:endParaRPr lang="en-US"/>
@@ -1039,6 +1054,7 @@
           <a:p>
             <a:fld id="{5C91B516-820E-4688-AFA5-AAF86CC8F7E6}" type="datetimeFigureOut">
               <a:rPr lang="en-US" smtClean="0"/>
+              <a:pPr/>
               <a:t>8/8/2016</a:t>
             </a:fld>
             <a:endParaRPr lang="en-US"/>
@@ -1081,6 +1097,7 @@
           <a:p>
             <a:fld id="{694BE614-E7CF-41F8-AE74-BA270906C318}" type="slidenum">
               <a:rPr lang="en-US" smtClean="0"/>
+              <a:pPr/>
               <a:t>‹#›</a:t>
             </a:fld>
             <a:endParaRPr lang="en-US"/>
@@ -1322,6 +1339,7 @@
           <a:p>
             <a:fld id="{5C91B516-820E-4688-AFA5-AAF86CC8F7E6}" type="datetimeFigureOut">
               <a:rPr lang="en-US" smtClean="0"/>
+              <a:pPr/>
               <a:t>8/8/2016</a:t>
             </a:fld>
             <a:endParaRPr lang="en-US"/>
@@ -1364,6 +1382,7 @@
           <a:p>
             <a:fld id="{694BE614-E7CF-41F8-AE74-BA270906C318}" type="slidenum">
               <a:rPr lang="en-US" smtClean="0"/>
+              <a:pPr/>
               <a:t>‹#›</a:t>
             </a:fld>
             <a:endParaRPr lang="en-US"/>
@@ -1739,6 +1758,7 @@
           <a:p>
             <a:fld id="{5C91B516-820E-4688-AFA5-AAF86CC8F7E6}" type="datetimeFigureOut">
               <a:rPr lang="en-US" smtClean="0"/>
+              <a:pPr/>
               <a:t>8/8/2016</a:t>
             </a:fld>
             <a:endParaRPr lang="en-US"/>
@@ -1781,6 +1801,7 @@
           <a:p>
             <a:fld id="{694BE614-E7CF-41F8-AE74-BA270906C318}" type="slidenum">
               <a:rPr lang="en-US" smtClean="0"/>
+              <a:pPr/>
               <a:t>‹#›</a:t>
             </a:fld>
             <a:endParaRPr lang="en-US"/>
@@ -1852,6 +1873,7 @@
           <a:p>
             <a:fld id="{5C91B516-820E-4688-AFA5-AAF86CC8F7E6}" type="datetimeFigureOut">
               <a:rPr lang="en-US" smtClean="0"/>
+              <a:pPr/>
               <a:t>8/8/2016</a:t>
             </a:fld>
             <a:endParaRPr lang="en-US"/>
@@ -1894,6 +1916,7 @@
           <a:p>
             <a:fld id="{694BE614-E7CF-41F8-AE74-BA270906C318}" type="slidenum">
               <a:rPr lang="en-US" smtClean="0"/>
+              <a:pPr/>
               <a:t>‹#›</a:t>
             </a:fld>
             <a:endParaRPr lang="en-US"/>
@@ -1942,6 +1965,7 @@
           <a:p>
             <a:fld id="{5C91B516-820E-4688-AFA5-AAF86CC8F7E6}" type="datetimeFigureOut">
               <a:rPr lang="en-US" smtClean="0"/>
+              <a:pPr/>
               <a:t>8/8/2016</a:t>
             </a:fld>
             <a:endParaRPr lang="en-US"/>
@@ -1984,6 +2008,7 @@
           <a:p>
             <a:fld id="{694BE614-E7CF-41F8-AE74-BA270906C318}" type="slidenum">
               <a:rPr lang="en-US" smtClean="0"/>
+              <a:pPr/>
               <a:t>‹#›</a:t>
             </a:fld>
             <a:endParaRPr lang="en-US"/>
@@ -2214,6 +2239,7 @@
           <a:p>
             <a:fld id="{5C91B516-820E-4688-AFA5-AAF86CC8F7E6}" type="datetimeFigureOut">
               <a:rPr lang="en-US" smtClean="0"/>
+              <a:pPr/>
               <a:t>8/8/2016</a:t>
             </a:fld>
             <a:endParaRPr lang="en-US"/>
@@ -2256,6 +2282,7 @@
           <a:p>
             <a:fld id="{694BE614-E7CF-41F8-AE74-BA270906C318}" type="slidenum">
               <a:rPr lang="en-US" smtClean="0"/>
+              <a:pPr/>
               <a:t>‹#›</a:t>
             </a:fld>
             <a:endParaRPr lang="en-US"/>
@@ -2462,6 +2489,7 @@
           <a:p>
             <a:fld id="{5C91B516-820E-4688-AFA5-AAF86CC8F7E6}" type="datetimeFigureOut">
               <a:rPr lang="en-US" smtClean="0"/>
+              <a:pPr/>
               <a:t>8/8/2016</a:t>
             </a:fld>
             <a:endParaRPr lang="en-US"/>
@@ -2504,6 +2532,7 @@
           <a:p>
             <a:fld id="{694BE614-E7CF-41F8-AE74-BA270906C318}" type="slidenum">
               <a:rPr lang="en-US" smtClean="0"/>
+              <a:pPr/>
               <a:t>‹#›</a:t>
             </a:fld>
             <a:endParaRPr lang="en-US"/>
@@ -2670,6 +2699,7 @@
           <a:p>
             <a:fld id="{5C91B516-820E-4688-AFA5-AAF86CC8F7E6}" type="datetimeFigureOut">
               <a:rPr lang="en-US" smtClean="0"/>
+              <a:pPr/>
               <a:t>8/8/2016</a:t>
             </a:fld>
             <a:endParaRPr lang="en-US"/>
@@ -2748,6 +2778,7 @@
           <a:p>
             <a:fld id="{694BE614-E7CF-41F8-AE74-BA270906C318}" type="slidenum">
               <a:rPr lang="en-US" smtClean="0"/>
+              <a:pPr/>
               <a:t>‹#›</a:t>
             </a:fld>
             <a:endParaRPr lang="en-US"/>
@@ -3056,10 +3087,14 @@
           <a:lstStyle/>
           <a:p>
             <a:r>
-              <a:rPr lang="en-US" dirty="0" smtClean="0"/>
-              <a:t>CAR POOL</a:t>
-            </a:r>
-            <a:endParaRPr lang="en-US" dirty="0"/>
+              <a:rPr lang="en-US" b="1" u="sng" dirty="0" smtClean="0"/>
+              <a:t>CAR </a:t>
+            </a:r>
+            <a:r>
+              <a:rPr lang="en-US" b="1" u="sng" dirty="0" smtClean="0"/>
+              <a:t>POOL</a:t>
+            </a:r>
+            <a:endParaRPr lang="en-US" b="1" u="sng" dirty="0"/>
           </a:p>
         </p:txBody>
       </p:sp>
@@ -3075,7 +3110,7 @@
         </p:nvSpPr>
         <p:spPr>
           <a:xfrm>
-            <a:off x="3581400" y="3886200"/>
+            <a:off x="4648200" y="4191000"/>
             <a:ext cx="4191000" cy="1752600"/>
           </a:xfrm>
         </p:spPr>
@@ -3089,25 +3124,58 @@
                   <a:schemeClr val="tx1"/>
                 </a:solidFill>
               </a:rPr>
-              <a:t>Pooja Mane</a:t>
-            </a:r>
-          </a:p>
-          <a:p>
+              <a:t>                  - </a:t>
+            </a:r>
+            <a:r>
+              <a:rPr lang="en-US" sz="2000" dirty="0" smtClean="0">
+                <a:solidFill>
+                  <a:schemeClr val="tx1"/>
+                </a:solidFill>
+              </a:rPr>
+              <a:t>Contributors  </a:t>
+            </a:r>
+            <a:endParaRPr lang="en-US" dirty="0" smtClean="0">
+              <a:solidFill>
+                <a:schemeClr val="tx1"/>
+              </a:solidFill>
+            </a:endParaRPr>
+          </a:p>
+          <a:p>
+            <a:pPr algn="r"/>
+            <a:r>
+              <a:rPr lang="en-US" dirty="0" err="1" smtClean="0">
+                <a:solidFill>
+                  <a:schemeClr val="tx1"/>
+                </a:solidFill>
+              </a:rPr>
+              <a:t>Pooja</a:t>
+            </a:r>
             <a:r>
               <a:rPr lang="en-US" dirty="0" smtClean="0">
                 <a:solidFill>
                   <a:schemeClr val="tx1"/>
                 </a:solidFill>
               </a:rPr>
-              <a:t>Sri </a:t>
-            </a:r>
-            <a:r>
-              <a:rPr lang="en-US" dirty="0" err="1" smtClean="0">
+              <a:t> </a:t>
+            </a:r>
+            <a:r>
+              <a:rPr lang="en-US" dirty="0" smtClean="0">
                 <a:solidFill>
                   <a:schemeClr val="tx1"/>
                 </a:solidFill>
               </a:rPr>
-              <a:t>Harsha</a:t>
+              <a:t>Mane</a:t>
+            </a:r>
+          </a:p>
+          <a:p>
+            <a:pPr algn="r"/>
+            <a:r>
+              <a:rPr lang="en-US" dirty="0" smtClean="0">
+                <a:solidFill>
+                  <a:schemeClr val="tx1"/>
+                </a:solidFill>
+              </a:rPr>
+              <a:t>Sriharsha Makineni</a:t>
             </a:r>
             <a:endParaRPr lang="en-US" dirty="0" smtClean="0">
               <a:solidFill>
@@ -3121,6 +3189,702 @@
                 <a:schemeClr val="tx1"/>
               </a:solidFill>
             </a:endParaRPr>
+          </a:p>
+        </p:txBody>
+      </p:sp>
+    </p:spTree>
+  </p:cSld>
+  <p:clrMapOvr>
+    <a:masterClrMapping/>
+  </p:clrMapOvr>
+</p:sld>
+</file>
+
+<file path=ppt/slides/slide10.xml><?xml version="1.0" encoding="utf-8"?>
+<p:sld xmlns:a="http://schemas.openxmlformats.org/drawingml/2006/main" xmlns:r="http://schemas.openxmlformats.org/officeDocument/2006/relationships" xmlns:p="http://schemas.openxmlformats.org/presentationml/2006/main">
+  <p:cSld>
+    <p:spTree>
+      <p:nvGrpSpPr>
+        <p:cNvPr id="1" name=""/>
+        <p:cNvGrpSpPr/>
+        <p:nvPr/>
+      </p:nvGrpSpPr>
+      <p:grpSpPr>
+        <a:xfrm>
+          <a:off x="0" y="0"/>
+          <a:ext cx="0" cy="0"/>
+          <a:chOff x="0" y="0"/>
+          <a:chExt cx="0" cy="0"/>
+        </a:xfrm>
+      </p:grpSpPr>
+      <p:sp>
+        <p:nvSpPr>
+          <p:cNvPr id="2" name="Title 1"/>
+          <p:cNvSpPr>
+            <a:spLocks noGrp="1"/>
+          </p:cNvSpPr>
+          <p:nvPr>
+            <p:ph type="title"/>
+          </p:nvPr>
+        </p:nvSpPr>
+        <p:spPr>
+          <a:xfrm>
+            <a:off x="457200" y="274638"/>
+            <a:ext cx="8229600" cy="792162"/>
+          </a:xfrm>
+        </p:spPr>
+        <p:txBody>
+          <a:bodyPr>
+            <a:normAutofit/>
+          </a:bodyPr>
+          <a:lstStyle/>
+          <a:p>
+            <a:r>
+              <a:rPr lang="en-US" sz="4000" dirty="0" smtClean="0"/>
+              <a:t>CAR POOL</a:t>
+            </a:r>
+            <a:endParaRPr lang="en-IN" sz="4000" dirty="0"/>
+          </a:p>
+        </p:txBody>
+      </p:sp>
+      <p:pic>
+        <p:nvPicPr>
+          <p:cNvPr id="5122" name="Picture 2" descr="C:\Users\sriharsha\Desktop\carpool pics\Screenshot_20160809-031236.png"/>
+          <p:cNvPicPr>
+            <a:picLocks noChangeAspect="1" noChangeArrowheads="1"/>
+          </p:cNvPicPr>
+          <p:nvPr/>
+        </p:nvPicPr>
+        <p:blipFill>
+          <a:blip r:embed="rId2" cstate="print"/>
+          <a:srcRect/>
+          <a:stretch>
+            <a:fillRect/>
+          </a:stretch>
+        </p:blipFill>
+        <p:spPr bwMode="auto">
+          <a:xfrm>
+            <a:off x="457200" y="1752600"/>
+            <a:ext cx="2571750" cy="4572000"/>
+          </a:xfrm>
+          <a:prstGeom prst="rect">
+            <a:avLst/>
+          </a:prstGeom>
+          <a:noFill/>
+        </p:spPr>
+      </p:pic>
+      <p:pic>
+        <p:nvPicPr>
+          <p:cNvPr id="5123" name="Picture 3" descr="C:\Users\sriharsha\Desktop\carpool pics\Screenshot_20160809-031243.png"/>
+          <p:cNvPicPr>
+            <a:picLocks noChangeAspect="1" noChangeArrowheads="1"/>
+          </p:cNvPicPr>
+          <p:nvPr/>
+        </p:nvPicPr>
+        <p:blipFill>
+          <a:blip r:embed="rId3" cstate="print"/>
+          <a:srcRect/>
+          <a:stretch>
+            <a:fillRect/>
+          </a:stretch>
+        </p:blipFill>
+        <p:spPr bwMode="auto">
+          <a:xfrm>
+            <a:off x="3276600" y="1752600"/>
+            <a:ext cx="2581275" cy="4588934"/>
+          </a:xfrm>
+          <a:prstGeom prst="rect">
+            <a:avLst/>
+          </a:prstGeom>
+          <a:noFill/>
+        </p:spPr>
+      </p:pic>
+      <p:pic>
+        <p:nvPicPr>
+          <p:cNvPr id="5" name="Picture 2" descr="C:\Users\sriharsha\Desktop\carpool pics\Screenshot_20160809-031251.png"/>
+          <p:cNvPicPr>
+            <a:picLocks noChangeAspect="1" noChangeArrowheads="1"/>
+          </p:cNvPicPr>
+          <p:nvPr/>
+        </p:nvPicPr>
+        <p:blipFill>
+          <a:blip r:embed="rId4" cstate="print"/>
+          <a:srcRect/>
+          <a:stretch>
+            <a:fillRect/>
+          </a:stretch>
+        </p:blipFill>
+        <p:spPr bwMode="auto">
+          <a:xfrm>
+            <a:off x="6172200" y="1752600"/>
+            <a:ext cx="2614613" cy="4648200"/>
+          </a:xfrm>
+          <a:prstGeom prst="rect">
+            <a:avLst/>
+          </a:prstGeom>
+          <a:noFill/>
+        </p:spPr>
+      </p:pic>
+      <p:sp>
+        <p:nvSpPr>
+          <p:cNvPr id="6" name="TextBox 5"/>
+          <p:cNvSpPr txBox="1"/>
+          <p:nvPr/>
+        </p:nvSpPr>
+        <p:spPr>
+          <a:xfrm>
+            <a:off x="533400" y="1371600"/>
+            <a:ext cx="2438400" cy="369332"/>
+          </a:xfrm>
+          <a:prstGeom prst="rect">
+            <a:avLst/>
+          </a:prstGeom>
+          <a:noFill/>
+        </p:spPr>
+        <p:txBody>
+          <a:bodyPr wrap="square" rtlCol="0">
+            <a:spAutoFit/>
+          </a:bodyPr>
+          <a:lstStyle/>
+          <a:p>
+            <a:pPr algn="ctr"/>
+            <a:r>
+              <a:rPr lang="en-US" dirty="0" smtClean="0"/>
+              <a:t>Available Rides</a:t>
+            </a:r>
+            <a:endParaRPr lang="en-IN" dirty="0"/>
+          </a:p>
+        </p:txBody>
+      </p:sp>
+      <p:sp>
+        <p:nvSpPr>
+          <p:cNvPr id="7" name="TextBox 6"/>
+          <p:cNvSpPr txBox="1"/>
+          <p:nvPr/>
+        </p:nvSpPr>
+        <p:spPr>
+          <a:xfrm>
+            <a:off x="3429000" y="1371600"/>
+            <a:ext cx="2209800" cy="369332"/>
+          </a:xfrm>
+          <a:prstGeom prst="rect">
+            <a:avLst/>
+          </a:prstGeom>
+          <a:noFill/>
+        </p:spPr>
+        <p:txBody>
+          <a:bodyPr wrap="square" rtlCol="0">
+            <a:spAutoFit/>
+          </a:bodyPr>
+          <a:lstStyle/>
+          <a:p>
+            <a:pPr algn="ctr"/>
+            <a:r>
+              <a:rPr lang="en-US" dirty="0" smtClean="0"/>
+              <a:t>Search location</a:t>
+            </a:r>
+            <a:endParaRPr lang="en-IN" dirty="0"/>
+          </a:p>
+        </p:txBody>
+      </p:sp>
+      <p:sp>
+        <p:nvSpPr>
+          <p:cNvPr id="10" name="TextBox 9"/>
+          <p:cNvSpPr txBox="1"/>
+          <p:nvPr/>
+        </p:nvSpPr>
+        <p:spPr>
+          <a:xfrm>
+            <a:off x="6629400" y="1371600"/>
+            <a:ext cx="2514600" cy="369332"/>
+          </a:xfrm>
+          <a:prstGeom prst="rect">
+            <a:avLst/>
+          </a:prstGeom>
+          <a:noFill/>
+        </p:spPr>
+        <p:txBody>
+          <a:bodyPr wrap="square" rtlCol="0">
+            <a:spAutoFit/>
+          </a:bodyPr>
+          <a:lstStyle/>
+          <a:p>
+            <a:r>
+              <a:rPr lang="en-US" dirty="0" smtClean="0"/>
+              <a:t>Confirm location</a:t>
+            </a:r>
+            <a:endParaRPr lang="en-IN" dirty="0"/>
+          </a:p>
+        </p:txBody>
+      </p:sp>
+    </p:spTree>
+  </p:cSld>
+  <p:clrMapOvr>
+    <a:masterClrMapping/>
+  </p:clrMapOvr>
+</p:sld>
+</file>
+
+<file path=ppt/slides/slide11.xml><?xml version="1.0" encoding="utf-8"?>
+<p:sld xmlns:a="http://schemas.openxmlformats.org/drawingml/2006/main" xmlns:r="http://schemas.openxmlformats.org/officeDocument/2006/relationships" xmlns:p="http://schemas.openxmlformats.org/presentationml/2006/main">
+  <p:cSld>
+    <p:spTree>
+      <p:nvGrpSpPr>
+        <p:cNvPr id="1" name=""/>
+        <p:cNvGrpSpPr/>
+        <p:nvPr/>
+      </p:nvGrpSpPr>
+      <p:grpSpPr>
+        <a:xfrm>
+          <a:off x="0" y="0"/>
+          <a:ext cx="0" cy="0"/>
+          <a:chOff x="0" y="0"/>
+          <a:chExt cx="0" cy="0"/>
+        </a:xfrm>
+      </p:grpSpPr>
+      <p:sp>
+        <p:nvSpPr>
+          <p:cNvPr id="2" name="Title 1"/>
+          <p:cNvSpPr>
+            <a:spLocks noGrp="1"/>
+          </p:cNvSpPr>
+          <p:nvPr>
+            <p:ph type="title"/>
+          </p:nvPr>
+        </p:nvSpPr>
+        <p:spPr>
+          <a:xfrm>
+            <a:off x="457200" y="274638"/>
+            <a:ext cx="8229600" cy="792162"/>
+          </a:xfrm>
+        </p:spPr>
+        <p:txBody>
+          <a:bodyPr>
+            <a:normAutofit/>
+          </a:bodyPr>
+          <a:lstStyle/>
+          <a:p>
+            <a:r>
+              <a:rPr lang="en-US" sz="4000" dirty="0" smtClean="0"/>
+              <a:t>CAR POOL</a:t>
+            </a:r>
+            <a:endParaRPr lang="en-IN" sz="4000" dirty="0"/>
+          </a:p>
+        </p:txBody>
+      </p:sp>
+      <p:pic>
+        <p:nvPicPr>
+          <p:cNvPr id="6147" name="Picture 3" descr="C:\Users\sriharsha\Desktop\carpool pics\Screenshot_20160809-031255.png"/>
+          <p:cNvPicPr>
+            <a:picLocks noChangeAspect="1" noChangeArrowheads="1"/>
+          </p:cNvPicPr>
+          <p:nvPr/>
+        </p:nvPicPr>
+        <p:blipFill>
+          <a:blip r:embed="rId2" cstate="print"/>
+          <a:srcRect/>
+          <a:stretch>
+            <a:fillRect/>
+          </a:stretch>
+        </p:blipFill>
+        <p:spPr bwMode="auto">
+          <a:xfrm>
+            <a:off x="381000" y="1752600"/>
+            <a:ext cx="2614613" cy="4648200"/>
+          </a:xfrm>
+          <a:prstGeom prst="rect">
+            <a:avLst/>
+          </a:prstGeom>
+          <a:noFill/>
+        </p:spPr>
+      </p:pic>
+      <p:pic>
+        <p:nvPicPr>
+          <p:cNvPr id="5" name="Picture 2" descr="C:\Users\sriharsha\Desktop\carpool pics\Screenshot_20160809-031302.png"/>
+          <p:cNvPicPr>
+            <a:picLocks noChangeAspect="1" noChangeArrowheads="1"/>
+          </p:cNvPicPr>
+          <p:nvPr/>
+        </p:nvPicPr>
+        <p:blipFill>
+          <a:blip r:embed="rId3" cstate="print"/>
+          <a:srcRect/>
+          <a:stretch>
+            <a:fillRect/>
+          </a:stretch>
+        </p:blipFill>
+        <p:spPr bwMode="auto">
+          <a:xfrm>
+            <a:off x="3276600" y="1752600"/>
+            <a:ext cx="2633663" cy="4682066"/>
+          </a:xfrm>
+          <a:prstGeom prst="rect">
+            <a:avLst/>
+          </a:prstGeom>
+          <a:noFill/>
+        </p:spPr>
+      </p:pic>
+      <p:pic>
+        <p:nvPicPr>
+          <p:cNvPr id="6" name="Picture 3" descr="C:\Users\sriharsha\Desktop\carpool pics\Screenshot_20160809-031308.png"/>
+          <p:cNvPicPr>
+            <a:picLocks noChangeAspect="1" noChangeArrowheads="1"/>
+          </p:cNvPicPr>
+          <p:nvPr/>
+        </p:nvPicPr>
+        <p:blipFill>
+          <a:blip r:embed="rId4" cstate="print"/>
+          <a:srcRect/>
+          <a:stretch>
+            <a:fillRect/>
+          </a:stretch>
+        </p:blipFill>
+        <p:spPr bwMode="auto">
+          <a:xfrm>
+            <a:off x="6248400" y="1752600"/>
+            <a:ext cx="2614613" cy="4648200"/>
+          </a:xfrm>
+          <a:prstGeom prst="rect">
+            <a:avLst/>
+          </a:prstGeom>
+          <a:noFill/>
+        </p:spPr>
+      </p:pic>
+      <p:sp>
+        <p:nvSpPr>
+          <p:cNvPr id="7" name="TextBox 6"/>
+          <p:cNvSpPr txBox="1"/>
+          <p:nvPr/>
+        </p:nvSpPr>
+        <p:spPr>
+          <a:xfrm>
+            <a:off x="533400" y="1371600"/>
+            <a:ext cx="2209800" cy="369332"/>
+          </a:xfrm>
+          <a:prstGeom prst="rect">
+            <a:avLst/>
+          </a:prstGeom>
+          <a:noFill/>
+        </p:spPr>
+        <p:txBody>
+          <a:bodyPr wrap="square" rtlCol="0">
+            <a:spAutoFit/>
+          </a:bodyPr>
+          <a:lstStyle/>
+          <a:p>
+            <a:pPr algn="ctr"/>
+            <a:r>
+              <a:rPr lang="en-US" dirty="0" smtClean="0"/>
+              <a:t>Ride Selection</a:t>
+            </a:r>
+            <a:endParaRPr lang="en-IN" dirty="0"/>
+          </a:p>
+        </p:txBody>
+      </p:sp>
+      <p:sp>
+        <p:nvSpPr>
+          <p:cNvPr id="8" name="TextBox 7"/>
+          <p:cNvSpPr txBox="1"/>
+          <p:nvPr/>
+        </p:nvSpPr>
+        <p:spPr>
+          <a:xfrm>
+            <a:off x="3810000" y="1371600"/>
+            <a:ext cx="1981200" cy="646331"/>
+          </a:xfrm>
+          <a:prstGeom prst="rect">
+            <a:avLst/>
+          </a:prstGeom>
+          <a:noFill/>
+        </p:spPr>
+        <p:txBody>
+          <a:bodyPr wrap="square" rtlCol="0">
+            <a:spAutoFit/>
+          </a:bodyPr>
+          <a:lstStyle/>
+          <a:p>
+            <a:r>
+              <a:rPr lang="en-US" dirty="0" smtClean="0"/>
+              <a:t>Ride Selection</a:t>
+            </a:r>
+            <a:endParaRPr lang="en-IN" dirty="0" smtClean="0"/>
+          </a:p>
+          <a:p>
+            <a:endParaRPr lang="en-IN" dirty="0"/>
+          </a:p>
+        </p:txBody>
+      </p:sp>
+      <p:sp>
+        <p:nvSpPr>
+          <p:cNvPr id="9" name="TextBox 8"/>
+          <p:cNvSpPr txBox="1"/>
+          <p:nvPr/>
+        </p:nvSpPr>
+        <p:spPr>
+          <a:xfrm>
+            <a:off x="6400800" y="1371600"/>
+            <a:ext cx="2286000" cy="369332"/>
+          </a:xfrm>
+          <a:prstGeom prst="rect">
+            <a:avLst/>
+          </a:prstGeom>
+          <a:noFill/>
+        </p:spPr>
+        <p:txBody>
+          <a:bodyPr wrap="square" rtlCol="0">
+            <a:spAutoFit/>
+          </a:bodyPr>
+          <a:lstStyle/>
+          <a:p>
+            <a:pPr algn="ctr"/>
+            <a:r>
+              <a:rPr lang="en-US" dirty="0" smtClean="0"/>
+              <a:t>Ride booked</a:t>
+            </a:r>
+            <a:endParaRPr lang="en-IN" dirty="0"/>
+          </a:p>
+        </p:txBody>
+      </p:sp>
+    </p:spTree>
+  </p:cSld>
+  <p:clrMapOvr>
+    <a:masterClrMapping/>
+  </p:clrMapOvr>
+</p:sld>
+</file>
+
+<file path=ppt/slides/slide12.xml><?xml version="1.0" encoding="utf-8"?>
+<p:sld xmlns:a="http://schemas.openxmlformats.org/drawingml/2006/main" xmlns:r="http://schemas.openxmlformats.org/officeDocument/2006/relationships" xmlns:p="http://schemas.openxmlformats.org/presentationml/2006/main">
+  <p:cSld>
+    <p:spTree>
+      <p:nvGrpSpPr>
+        <p:cNvPr id="1" name=""/>
+        <p:cNvGrpSpPr/>
+        <p:nvPr/>
+      </p:nvGrpSpPr>
+      <p:grpSpPr>
+        <a:xfrm>
+          <a:off x="0" y="0"/>
+          <a:ext cx="0" cy="0"/>
+          <a:chOff x="0" y="0"/>
+          <a:chExt cx="0" cy="0"/>
+        </a:xfrm>
+      </p:grpSpPr>
+      <p:sp>
+        <p:nvSpPr>
+          <p:cNvPr id="2" name="Title 1"/>
+          <p:cNvSpPr>
+            <a:spLocks noGrp="1"/>
+          </p:cNvSpPr>
+          <p:nvPr>
+            <p:ph type="title"/>
+          </p:nvPr>
+        </p:nvSpPr>
+        <p:spPr>
+          <a:xfrm>
+            <a:off x="457200" y="274638"/>
+            <a:ext cx="8229600" cy="639762"/>
+          </a:xfrm>
+        </p:spPr>
+        <p:txBody>
+          <a:bodyPr>
+            <a:normAutofit fontScale="90000"/>
+          </a:bodyPr>
+          <a:lstStyle/>
+          <a:p>
+            <a:r>
+              <a:rPr lang="en-US" sz="4000" dirty="0" smtClean="0"/>
+              <a:t>CAR POOL</a:t>
+            </a:r>
+            <a:endParaRPr lang="en-IN" sz="4000" dirty="0"/>
+          </a:p>
+        </p:txBody>
+      </p:sp>
+      <p:pic>
+        <p:nvPicPr>
+          <p:cNvPr id="5" name="Picture 2" descr="C:\Users\sriharsha\Desktop\carpool pics\Screenshot_20160809-031420.png"/>
+          <p:cNvPicPr>
+            <a:picLocks noChangeAspect="1" noChangeArrowheads="1"/>
+          </p:cNvPicPr>
+          <p:nvPr/>
+        </p:nvPicPr>
+        <p:blipFill>
+          <a:blip r:embed="rId2" cstate="print"/>
+          <a:srcRect/>
+          <a:stretch>
+            <a:fillRect/>
+          </a:stretch>
+        </p:blipFill>
+        <p:spPr bwMode="auto">
+          <a:xfrm>
+            <a:off x="914400" y="1447800"/>
+            <a:ext cx="2743200" cy="4876800"/>
+          </a:xfrm>
+          <a:prstGeom prst="rect">
+            <a:avLst/>
+          </a:prstGeom>
+          <a:noFill/>
+        </p:spPr>
+      </p:pic>
+      <p:pic>
+        <p:nvPicPr>
+          <p:cNvPr id="6" name="Picture 3" descr="C:\Users\sriharsha\Desktop\carpool pics\Screenshot_20160809-031951.png"/>
+          <p:cNvPicPr>
+            <a:picLocks noChangeAspect="1" noChangeArrowheads="1"/>
+          </p:cNvPicPr>
+          <p:nvPr/>
+        </p:nvPicPr>
+        <p:blipFill>
+          <a:blip r:embed="rId3" cstate="print"/>
+          <a:srcRect/>
+          <a:stretch>
+            <a:fillRect/>
+          </a:stretch>
+        </p:blipFill>
+        <p:spPr bwMode="auto">
+          <a:xfrm>
+            <a:off x="5372100" y="1447800"/>
+            <a:ext cx="2828925" cy="5029199"/>
+          </a:xfrm>
+          <a:prstGeom prst="rect">
+            <a:avLst/>
+          </a:prstGeom>
+          <a:noFill/>
+        </p:spPr>
+      </p:pic>
+      <p:sp>
+        <p:nvSpPr>
+          <p:cNvPr id="7" name="TextBox 6"/>
+          <p:cNvSpPr txBox="1"/>
+          <p:nvPr/>
+        </p:nvSpPr>
+        <p:spPr>
+          <a:xfrm>
+            <a:off x="1066800" y="914400"/>
+            <a:ext cx="2438400" cy="369332"/>
+          </a:xfrm>
+          <a:prstGeom prst="rect">
+            <a:avLst/>
+          </a:prstGeom>
+          <a:noFill/>
+        </p:spPr>
+        <p:txBody>
+          <a:bodyPr wrap="square" rtlCol="0">
+            <a:spAutoFit/>
+          </a:bodyPr>
+          <a:lstStyle/>
+          <a:p>
+            <a:r>
+              <a:rPr lang="en-US" dirty="0" smtClean="0"/>
+              <a:t>Email after offering ride</a:t>
+            </a:r>
+            <a:endParaRPr lang="en-IN" dirty="0"/>
+          </a:p>
+        </p:txBody>
+      </p:sp>
+      <p:sp>
+        <p:nvSpPr>
+          <p:cNvPr id="8" name="TextBox 7"/>
+          <p:cNvSpPr txBox="1"/>
+          <p:nvPr/>
+        </p:nvSpPr>
+        <p:spPr>
+          <a:xfrm>
+            <a:off x="5181600" y="990600"/>
+            <a:ext cx="3200400" cy="369332"/>
+          </a:xfrm>
+          <a:prstGeom prst="rect">
+            <a:avLst/>
+          </a:prstGeom>
+          <a:noFill/>
+        </p:spPr>
+        <p:txBody>
+          <a:bodyPr wrap="square" rtlCol="0">
+            <a:spAutoFit/>
+          </a:bodyPr>
+          <a:lstStyle/>
+          <a:p>
+            <a:pPr algn="ctr"/>
+            <a:r>
+              <a:rPr lang="en-US" dirty="0" smtClean="0"/>
+              <a:t>Email after booking the ride</a:t>
+            </a:r>
+            <a:endParaRPr lang="en-IN" dirty="0"/>
+          </a:p>
+        </p:txBody>
+      </p:sp>
+    </p:spTree>
+  </p:cSld>
+  <p:clrMapOvr>
+    <a:masterClrMapping/>
+  </p:clrMapOvr>
+</p:sld>
+</file>
+
+<file path=ppt/slides/slide13.xml><?xml version="1.0" encoding="utf-8"?>
+<p:sld xmlns:a="http://schemas.openxmlformats.org/drawingml/2006/main" xmlns:r="http://schemas.openxmlformats.org/officeDocument/2006/relationships" xmlns:p="http://schemas.openxmlformats.org/presentationml/2006/main">
+  <p:cSld>
+    <p:spTree>
+      <p:nvGrpSpPr>
+        <p:cNvPr id="1" name=""/>
+        <p:cNvGrpSpPr/>
+        <p:nvPr/>
+      </p:nvGrpSpPr>
+      <p:grpSpPr>
+        <a:xfrm>
+          <a:off x="0" y="0"/>
+          <a:ext cx="0" cy="0"/>
+          <a:chOff x="0" y="0"/>
+          <a:chExt cx="0" cy="0"/>
+        </a:xfrm>
+      </p:grpSpPr>
+      <p:sp>
+        <p:nvSpPr>
+          <p:cNvPr id="2" name="Title 1"/>
+          <p:cNvSpPr>
+            <a:spLocks noGrp="1"/>
+          </p:cNvSpPr>
+          <p:nvPr>
+            <p:ph type="title"/>
+          </p:nvPr>
+        </p:nvSpPr>
+        <p:spPr/>
+        <p:txBody>
+          <a:bodyPr/>
+          <a:lstStyle/>
+          <a:p>
+            <a:endParaRPr lang="en-IN"/>
+          </a:p>
+        </p:txBody>
+      </p:sp>
+      <p:sp>
+        <p:nvSpPr>
+          <p:cNvPr id="5" name="TextBox 4"/>
+          <p:cNvSpPr txBox="1"/>
+          <p:nvPr/>
+        </p:nvSpPr>
+        <p:spPr>
+          <a:xfrm>
+            <a:off x="1447800" y="2438400"/>
+            <a:ext cx="6400800" cy="1107996"/>
+          </a:xfrm>
+          <a:prstGeom prst="rect">
+            <a:avLst/>
+          </a:prstGeom>
+          <a:noFill/>
+        </p:spPr>
+        <p:txBody>
+          <a:bodyPr wrap="square" rtlCol="0">
+            <a:spAutoFit/>
+          </a:bodyPr>
+          <a:lstStyle/>
+          <a:p>
+            <a:pPr algn="ctr"/>
+            <a:r>
+              <a:rPr lang="en-US" sz="6600" dirty="0" smtClean="0"/>
+              <a:t>THANK YOU…!</a:t>
+            </a:r>
+            <a:endParaRPr lang="en-IN" sz="6600" dirty="0"/>
           </a:p>
         </p:txBody>
       </p:sp>
@@ -3165,10 +3929,10 @@
           <a:lstStyle/>
           <a:p>
             <a:r>
-              <a:rPr lang="en-US" dirty="0" smtClean="0"/>
+              <a:rPr lang="en-US" b="1" dirty="0" smtClean="0"/>
               <a:t>CAR POOL</a:t>
             </a:r>
-            <a:endParaRPr lang="en-US" dirty="0"/>
+            <a:endParaRPr lang="en-US" b="1" dirty="0"/>
           </a:p>
         </p:txBody>
       </p:sp>
@@ -3181,7 +3945,7 @@
         <p:spPr>
           <a:xfrm>
             <a:off x="1295400" y="1371600"/>
-            <a:ext cx="6553200" cy="3970318"/>
+            <a:ext cx="6553200" cy="4062651"/>
           </a:xfrm>
           <a:prstGeom prst="rect">
             <a:avLst/>
@@ -3200,9 +3964,14 @@
               <a:buNone/>
             </a:pPr>
             <a:r>
-              <a:rPr lang="en-US" dirty="0" smtClean="0"/>
-              <a:t>Details – </a:t>
-            </a:r>
+              <a:rPr lang="en-US" sz="2400" dirty="0" smtClean="0"/>
+              <a:t>Details </a:t>
+            </a:r>
+            <a:r>
+              <a:rPr lang="en-US" dirty="0" smtClean="0"/>
+              <a:t>-</a:t>
+            </a:r>
+            <a:endParaRPr lang="en-US" dirty="0" smtClean="0"/>
           </a:p>
           <a:p>
             <a:pPr lvl="0">
@@ -3221,12 +3990,12 @@
               <a:buNone/>
             </a:pPr>
             <a:r>
-              <a:rPr lang="en-US" dirty="0" smtClean="0"/>
-              <a:t>The </a:t>
-            </a:r>
-            <a:r>
               <a:rPr lang="en-US" dirty="0" err="1" smtClean="0"/>
               <a:t>GitHub</a:t>
+            </a:r>
+            <a:r>
+              <a:rPr lang="en-US" dirty="0" smtClean="0"/>
+              <a:t> Repository:</a:t>
             </a:r>
             <a:r>
               <a:rPr lang="en-US" dirty="0" smtClean="0"/>
@@ -3324,7 +4093,19 @@
             </a:br>
             <a:r>
               <a:rPr lang="en-US" dirty="0" smtClean="0"/>
-              <a:t>	Pooja – </a:t>
+              <a:t>	</a:t>
+            </a:r>
+            <a:r>
+              <a:rPr lang="en-US" dirty="0" err="1" smtClean="0"/>
+              <a:t>Pooja</a:t>
+            </a:r>
+            <a:r>
+              <a:rPr lang="en-US" dirty="0" smtClean="0"/>
+              <a:t>	</a:t>
+            </a:r>
+            <a:r>
+              <a:rPr lang="en-US" dirty="0" smtClean="0"/>
+              <a:t>- </a:t>
             </a:r>
             <a:r>
               <a:rPr lang="en-US" u="sng" dirty="0" smtClean="0">
@@ -3343,21 +4124,17 @@
             </a:br>
             <a:r>
               <a:rPr lang="en-US" dirty="0" smtClean="0"/>
-              <a:t>	Sri </a:t>
-            </a:r>
-            <a:r>
-              <a:rPr lang="en-US" dirty="0" err="1" smtClean="0"/>
-              <a:t>Harsha</a:t>
-            </a:r>
-            <a:r>
-              <a:rPr lang="en-US" dirty="0" smtClean="0"/>
-              <a:t>- </a:t>
-            </a:r>
-            <a:r>
-              <a:rPr lang="en-US" u="sng" dirty="0">
+              <a:t>	</a:t>
+            </a:r>
+            <a:r>
+              <a:rPr lang="en-US" dirty="0" smtClean="0"/>
+              <a:t>Sriharsha	- </a:t>
+            </a:r>
+            <a:r>
+              <a:rPr lang="en-US" u="sng" dirty="0" smtClean="0">
                 <a:hlinkClick r:id="rId3"/>
               </a:rPr>
-              <a:t>hasriharsha004@gmail.com</a:t>
+              <a:t>sriharsha004@gmail.com</a:t>
             </a:r>
             <a:endParaRPr lang="en-US" u="sng" dirty="0" smtClean="0">
               <a:solidFill>
@@ -3434,7 +4211,7 @@
         <p:spPr>
           <a:xfrm>
             <a:off x="1295400" y="1371600"/>
-            <a:ext cx="6553200" cy="4524315"/>
+            <a:ext cx="6553200" cy="4801314"/>
           </a:xfrm>
           <a:prstGeom prst="rect">
             <a:avLst/>
@@ -3476,7 +4253,7 @@
             </a:pPr>
             <a:r>
               <a:rPr lang="en-US" dirty="0" smtClean="0"/>
-              <a:t> Update Personal Information</a:t>
+              <a:t> User Sign-in / Register </a:t>
             </a:r>
           </a:p>
           <a:p>
@@ -3488,12 +4265,12 @@
               <a:buChar char="•"/>
             </a:pPr>
             <a:r>
-              <a:rPr lang="en-US" dirty="0"/>
+              <a:rPr lang="en-US" dirty="0" smtClean="0"/>
               <a:t> </a:t>
             </a:r>
             <a:r>
               <a:rPr lang="en-US" dirty="0" smtClean="0"/>
-              <a:t>Offer ride to destination</a:t>
+              <a:t>Update Personal Information</a:t>
             </a:r>
           </a:p>
           <a:p>
@@ -3505,8 +4282,12 @@
               <a:buChar char="•"/>
             </a:pPr>
             <a:r>
-              <a:rPr lang="en-US" dirty="0" smtClean="0"/>
-              <a:t> Book ride to specific destination</a:t>
+              <a:rPr lang="en-US" dirty="0"/>
+              <a:t> </a:t>
+            </a:r>
+            <a:r>
+              <a:rPr lang="en-US" dirty="0" smtClean="0"/>
+              <a:t>Offer ride to destination</a:t>
             </a:r>
           </a:p>
           <a:p>
@@ -3519,8 +4300,26 @@
             </a:pPr>
             <a:r>
               <a:rPr lang="en-US" dirty="0" smtClean="0"/>
-              <a:t> Sending information through Email</a:t>
-            </a:r>
+              <a:t> Book ride to specific destination</a:t>
+            </a:r>
+          </a:p>
+          <a:p>
+            <a:pPr lvl="0">
+              <a:spcBef>
+                <a:spcPts val="0"/>
+              </a:spcBef>
+              <a:buFont typeface="Arial" pitchFamily="34" charset="0"/>
+              <a:buChar char="•"/>
+            </a:pPr>
+            <a:r>
+              <a:rPr lang="en-US" dirty="0" smtClean="0"/>
+              <a:t> Sending </a:t>
+            </a:r>
+            <a:r>
+              <a:rPr lang="en-US" dirty="0" smtClean="0"/>
+              <a:t>ride information through email</a:t>
+            </a:r>
+            <a:endParaRPr lang="en-US" dirty="0" smtClean="0"/>
           </a:p>
           <a:p>
             <a:pPr lvl="0">
@@ -3573,8 +4372,12 @@
               <a:buChar char="•"/>
             </a:pPr>
             <a:r>
+              <a:rPr lang="en-US" dirty="0" smtClean="0"/>
+              <a:t> Get </a:t>
+            </a:r>
+            <a:r>
               <a:rPr lang="en-US" dirty="0"/>
-              <a:t>Get real time vehicle data for paid/free service</a:t>
+              <a:t>real time vehicle data for paid/free service</a:t>
             </a:r>
           </a:p>
           <a:p>
@@ -3583,9 +4386,18 @@
               <a:buChar char="•"/>
             </a:pPr>
             <a:r>
+              <a:rPr lang="en-US" dirty="0" smtClean="0"/>
+              <a:t> Integrate </a:t>
+            </a:r>
+            <a:r>
               <a:rPr lang="en-US" dirty="0"/>
-              <a:t>Integrate with a pay service</a:t>
-            </a:r>
+              <a:t>with a </a:t>
+            </a:r>
+            <a:r>
+              <a:rPr lang="en-US" dirty="0" smtClean="0"/>
+              <a:t>Payment gateway service</a:t>
+            </a:r>
+            <a:endParaRPr lang="en-US" dirty="0"/>
           </a:p>
           <a:p>
             <a:pPr lvl="0">
@@ -3593,8 +4405,12 @@
               <a:buChar char="•"/>
             </a:pPr>
             <a:r>
+              <a:rPr lang="en-US" dirty="0" smtClean="0"/>
+              <a:t> Introduce </a:t>
+            </a:r>
+            <a:r>
               <a:rPr lang="en-US" dirty="0"/>
-              <a:t>Introduce reward points to increase the number of customers</a:t>
+              <a:t>reward points to increase the number of customers</a:t>
             </a:r>
           </a:p>
           <a:p>
@@ -3674,8 +4490,8 @@
         </p:nvSpPr>
         <p:spPr>
           <a:xfrm>
-            <a:off x="1295400" y="1371600"/>
-            <a:ext cx="6553200" cy="5109091"/>
+            <a:off x="838200" y="1371600"/>
+            <a:ext cx="7543800" cy="5109091"/>
           </a:xfrm>
           <a:prstGeom prst="rect">
             <a:avLst/>
@@ -3729,8 +4545,17 @@
             </a:pPr>
             <a:r>
               <a:rPr lang="en-US" dirty="0" smtClean="0"/>
-              <a:t>Learnt Android Studio , app development</a:t>
-            </a:r>
+              <a:t> Learnt </a:t>
+            </a:r>
+            <a:r>
+              <a:rPr lang="en-US" dirty="0" smtClean="0"/>
+              <a:t>Android </a:t>
+            </a:r>
+            <a:r>
+              <a:rPr lang="en-US" dirty="0" smtClean="0"/>
+              <a:t>app development using Android Studio.</a:t>
+            </a:r>
+            <a:endParaRPr lang="en-US" dirty="0" smtClean="0"/>
           </a:p>
           <a:p>
             <a:pPr lvl="0">
@@ -3742,7 +4567,7 @@
             </a:pPr>
             <a:r>
               <a:rPr lang="en-US" dirty="0" smtClean="0"/>
-              <a:t>Learnt </a:t>
+              <a:t> Learnt using </a:t>
             </a:r>
             <a:r>
               <a:rPr lang="en-US" dirty="0" err="1" smtClean="0"/>
@@ -3750,8 +4575,17 @@
             </a:r>
             <a:r>
               <a:rPr lang="en-US" dirty="0" smtClean="0"/>
-              <a:t> Open Source database for mobile backend </a:t>
-            </a:r>
+              <a:t> </a:t>
+            </a:r>
+            <a:r>
+              <a:rPr lang="en-US" dirty="0" err="1" smtClean="0"/>
+              <a:t>mBaaS</a:t>
+            </a:r>
+            <a:r>
+              <a:rPr lang="en-US" dirty="0" smtClean="0"/>
+              <a:t> and writing Business Logics.</a:t>
+            </a:r>
+            <a:endParaRPr lang="en-US" dirty="0" smtClean="0"/>
           </a:p>
           <a:p>
             <a:pPr lvl="0">
@@ -3763,8 +4597,25 @@
             </a:pPr>
             <a:r>
               <a:rPr lang="en-US" dirty="0" smtClean="0"/>
-              <a:t>Learnt new functionality of sending e-mails</a:t>
-            </a:r>
+              <a:t> Learnt </a:t>
+            </a:r>
+            <a:r>
+              <a:rPr lang="en-US" dirty="0" smtClean="0"/>
+              <a:t>new functionality of sending </a:t>
+            </a:r>
+            <a:r>
+              <a:rPr lang="en-US" dirty="0" smtClean="0"/>
+              <a:t>e-mails by developing the Business Logic       on JSON data units in </a:t>
+            </a:r>
+            <a:r>
+              <a:rPr lang="en-US" dirty="0" err="1" smtClean="0"/>
+              <a:t>Kinvey</a:t>
+            </a:r>
+            <a:r>
+              <a:rPr lang="en-US" dirty="0" smtClean="0"/>
+              <a:t>.</a:t>
+            </a:r>
+            <a:endParaRPr lang="en-US" dirty="0" smtClean="0"/>
           </a:p>
           <a:p>
             <a:pPr lvl="0">
@@ -3797,8 +4648,29 @@
             </a:pPr>
             <a:r>
               <a:rPr lang="en-US" dirty="0" smtClean="0"/>
-              <a:t>Map Functionality</a:t>
-            </a:r>
+              <a:t> Setting a live GPS using Google Maps API.</a:t>
+            </a:r>
+            <a:endParaRPr lang="en-US" dirty="0"/>
+          </a:p>
+          <a:p>
+            <a:pPr lvl="0">
+              <a:spcBef>
+                <a:spcPts val="0"/>
+              </a:spcBef>
+            </a:pPr>
+            <a:endParaRPr lang="en-US" dirty="0" smtClean="0"/>
+          </a:p>
+          <a:p>
+            <a:pPr lvl="0">
+              <a:spcBef>
+                <a:spcPts val="0"/>
+              </a:spcBef>
+            </a:pPr>
+            <a:r>
+              <a:rPr lang="en-US" sz="2400" dirty="0" smtClean="0"/>
+              <a:t>Struggles-</a:t>
+            </a:r>
+            <a:endParaRPr lang="en-US" sz="2400" dirty="0" smtClean="0"/>
           </a:p>
           <a:p>
             <a:pPr lvl="0">
@@ -3810,28 +4682,25 @@
             </a:pPr>
             <a:r>
               <a:rPr lang="en-US" dirty="0" smtClean="0"/>
-              <a:t>Sending mails to multiple users</a:t>
-            </a:r>
-            <a:endParaRPr lang="en-US" dirty="0"/>
-          </a:p>
-          <a:p>
-            <a:pPr lvl="0">
-              <a:spcBef>
-                <a:spcPts val="0"/>
-              </a:spcBef>
-            </a:pPr>
+              <a:t> Finding </a:t>
+            </a:r>
+            <a:r>
+              <a:rPr lang="en-US" dirty="0" smtClean="0"/>
+              <a:t>online </a:t>
+            </a:r>
+            <a:r>
+              <a:rPr lang="en-US" dirty="0" smtClean="0"/>
+              <a:t>backend database </a:t>
+            </a:r>
+            <a:r>
+              <a:rPr lang="en-US" dirty="0" smtClean="0"/>
+              <a:t>to manage data used by </a:t>
+            </a:r>
+            <a:r>
+              <a:rPr lang="en-US" dirty="0" smtClean="0"/>
+              <a:t>application.</a:t>
+            </a:r>
             <a:endParaRPr lang="en-US" dirty="0" smtClean="0"/>
-          </a:p>
-          <a:p>
-            <a:pPr lvl="0">
-              <a:spcBef>
-                <a:spcPts val="0"/>
-              </a:spcBef>
-            </a:pPr>
-            <a:r>
-              <a:rPr lang="en-US" sz="2400" dirty="0" smtClean="0"/>
-              <a:t>Struggles</a:t>
-            </a:r>
           </a:p>
           <a:p>
             <a:pPr lvl="0">
@@ -3843,21 +4712,9 @@
             </a:pPr>
             <a:r>
               <a:rPr lang="en-US" dirty="0" smtClean="0"/>
-              <a:t>Finding online database to manage data used by app</a:t>
-            </a:r>
-          </a:p>
-          <a:p>
-            <a:pPr lvl="0">
-              <a:spcBef>
-                <a:spcPts val="0"/>
-              </a:spcBef>
-              <a:buFont typeface="Arial" pitchFamily="34" charset="0"/>
-              <a:buChar char="•"/>
-            </a:pPr>
-            <a:r>
-              <a:rPr lang="en-US" dirty="0" smtClean="0"/>
-              <a:t>Using Maps Functionality</a:t>
-            </a:r>
+              <a:t> Developing Maps Functionality.</a:t>
+            </a:r>
+            <a:endParaRPr lang="en-US" dirty="0" smtClean="0"/>
           </a:p>
           <a:p>
             <a:pPr lvl="0">
@@ -3934,8 +4791,8 @@
         </p:nvSpPr>
         <p:spPr>
           <a:xfrm>
-            <a:off x="1295400" y="1371600"/>
-            <a:ext cx="6553200" cy="4493538"/>
+            <a:off x="685800" y="1371600"/>
+            <a:ext cx="7924800" cy="5355312"/>
           </a:xfrm>
           <a:prstGeom prst="rect">
             <a:avLst/>
@@ -3977,7 +4834,7 @@
             </a:pPr>
             <a:r>
               <a:rPr lang="en-US" sz="2800" dirty="0" smtClean="0"/>
-              <a:t>Using </a:t>
+              <a:t> Using </a:t>
             </a:r>
             <a:r>
               <a:rPr lang="en-US" sz="2800" dirty="0" err="1" smtClean="0"/>
@@ -3992,7 +4849,11 @@
             </a:pPr>
             <a:r>
               <a:rPr lang="en-US" sz="2800" dirty="0" smtClean="0"/>
-              <a:t>Using Android studio for creating app</a:t>
+              <a:t> Using </a:t>
+            </a:r>
+            <a:r>
+              <a:rPr lang="en-US" sz="2800" dirty="0" smtClean="0"/>
+              <a:t>Android studio for creating app</a:t>
             </a:r>
           </a:p>
           <a:p>
@@ -4005,7 +4866,19 @@
             </a:pPr>
             <a:r>
               <a:rPr lang="en-US" sz="2800" dirty="0" smtClean="0"/>
-              <a:t>Use of Google API Services while     developing app</a:t>
+              <a:t> Use </a:t>
+            </a:r>
+            <a:r>
+              <a:rPr lang="en-US" sz="2800" dirty="0" smtClean="0"/>
+              <a:t>of Google API Services </a:t>
+            </a:r>
+            <a:r>
+              <a:rPr lang="en-US" sz="2800" dirty="0" smtClean="0"/>
+              <a:t>while developing </a:t>
+            </a:r>
+            <a:r>
+              <a:rPr lang="en-US" sz="2800" dirty="0" smtClean="0"/>
+              <a:t>app</a:t>
             </a:r>
           </a:p>
           <a:p>
@@ -4018,17 +4891,29 @@
             </a:pPr>
             <a:r>
               <a:rPr lang="en" sz="2800" dirty="0" smtClean="0"/>
-              <a:t>Google Maps on emulator </a:t>
-            </a:r>
-          </a:p>
-          <a:p>
-            <a:pPr>
+              <a:t> Google </a:t>
+            </a:r>
+            <a:r>
+              <a:rPr lang="en" sz="2800" dirty="0" smtClean="0"/>
+              <a:t>Maps on emulator </a:t>
+            </a:r>
+          </a:p>
+          <a:p>
+            <a:pPr lvl="0">
               <a:buFont typeface="Arial" pitchFamily="34" charset="0"/>
               <a:buChar char="•"/>
             </a:pPr>
             <a:r>
               <a:rPr lang="en-US" sz="2800" dirty="0" smtClean="0"/>
-              <a:t>Using </a:t>
+              <a:t> </a:t>
+            </a:r>
+            <a:r>
+              <a:rPr lang="en" sz="2800" dirty="0" smtClean="0"/>
+              <a:t>Database Integration </a:t>
+            </a:r>
+            <a:r>
+              <a:rPr lang="en-US" sz="2800" dirty="0" smtClean="0"/>
+              <a:t>using </a:t>
             </a:r>
             <a:r>
               <a:rPr lang="en-US" sz="2800" dirty="0" err="1" smtClean="0"/>
@@ -4048,12 +4933,13 @@
             </a:r>
             <a:r>
               <a:rPr lang="en-US" sz="2800" dirty="0" err="1" smtClean="0"/>
-              <a:t>mbaas</a:t>
+              <a:t>mBaaS</a:t>
             </a:r>
             <a:r>
               <a:rPr lang="en-US" sz="2800" dirty="0" smtClean="0"/>
               <a:t>)</a:t>
             </a:r>
+            <a:endParaRPr lang="en-US" sz="2800" dirty="0" smtClean="0"/>
           </a:p>
           <a:p>
             <a:pPr lvl="0">
@@ -4065,7 +4951,15 @@
             </a:pPr>
             <a:r>
               <a:rPr lang="en" sz="2800" dirty="0" smtClean="0"/>
-              <a:t>Database Integration</a:t>
+              <a:t> Developing Business Logics on data units </a:t>
+            </a:r>
+            <a:r>
+              <a:rPr lang="en-IN" sz="2800" dirty="0" smtClean="0"/>
+              <a:t>which are stored </a:t>
+            </a:r>
+            <a:r>
+              <a:rPr lang="en-IN" sz="2800" dirty="0" smtClean="0"/>
+              <a:t>as data objects using a JSON representation in the backend. </a:t>
             </a:r>
             <a:endParaRPr lang="en-US" sz="2800" dirty="0" smtClean="0"/>
           </a:p>
@@ -4123,104 +5017,701 @@
             <p:ph type="title"/>
           </p:nvPr>
         </p:nvSpPr>
-        <p:spPr/>
-        <p:txBody>
-          <a:bodyPr/>
-          <a:lstStyle/>
-          <a:p>
-            <a:r>
-              <a:rPr lang="en-US" dirty="0" smtClean="0"/>
+        <p:spPr>
+          <a:xfrm>
+            <a:off x="457200" y="274638"/>
+            <a:ext cx="8229600" cy="639762"/>
+          </a:xfrm>
+        </p:spPr>
+        <p:txBody>
+          <a:bodyPr>
+            <a:noAutofit/>
+          </a:bodyPr>
+          <a:lstStyle/>
+          <a:p>
+            <a:r>
+              <a:rPr lang="en-US" sz="4000" dirty="0" smtClean="0"/>
               <a:t>CAR POOL</a:t>
             </a:r>
-            <a:endParaRPr lang="en-US" dirty="0"/>
-          </a:p>
-        </p:txBody>
-      </p:sp>
-      <p:sp>
-        <p:nvSpPr>
-          <p:cNvPr id="3" name="Rectangle 2"/>
-          <p:cNvSpPr/>
+            <a:endParaRPr lang="en-US" sz="4000" dirty="0"/>
+          </a:p>
+        </p:txBody>
+      </p:sp>
+      <p:pic>
+        <p:nvPicPr>
+          <p:cNvPr id="1042" name="Picture 18" descr="C:\Users\sriharsha\Desktop\carpool pics\Screenshot_20160809-030904.png"/>
+          <p:cNvPicPr>
+            <a:picLocks noChangeAspect="1" noChangeArrowheads="1"/>
+          </p:cNvPicPr>
           <p:nvPr/>
-        </p:nvSpPr>
-        <p:spPr>
-          <a:xfrm>
-            <a:off x="1295400" y="1371600"/>
-            <a:ext cx="6553200" cy="3016210"/>
+        </p:nvPicPr>
+        <p:blipFill>
+          <a:blip r:embed="rId2" cstate="print"/>
+          <a:srcRect/>
+          <a:stretch>
+            <a:fillRect/>
+          </a:stretch>
+        </p:blipFill>
+        <p:spPr bwMode="auto">
+          <a:xfrm>
+            <a:off x="5715000" y="1371600"/>
+            <a:ext cx="2895600" cy="5181600"/>
           </a:xfrm>
           <a:prstGeom prst="rect">
             <a:avLst/>
           </a:prstGeom>
-        </p:spPr>
-        <p:txBody>
-          <a:bodyPr wrap="square">
+          <a:noFill/>
+        </p:spPr>
+      </p:pic>
+      <p:pic>
+        <p:nvPicPr>
+          <p:cNvPr id="1043" name="Picture 19" descr="C:\Users\sriharsha\Desktop\carpool pics\Screenshot_20160809-030947.png"/>
+          <p:cNvPicPr>
+            <a:picLocks noChangeAspect="1" noChangeArrowheads="1"/>
+          </p:cNvPicPr>
+          <p:nvPr/>
+        </p:nvPicPr>
+        <p:blipFill>
+          <a:blip r:embed="rId3" cstate="print"/>
+          <a:srcRect/>
+          <a:stretch>
+            <a:fillRect/>
+          </a:stretch>
+        </p:blipFill>
+        <p:spPr bwMode="auto">
+          <a:xfrm>
+            <a:off x="533400" y="1371600"/>
+            <a:ext cx="2914650" cy="5181600"/>
+          </a:xfrm>
+          <a:prstGeom prst="rect">
+            <a:avLst/>
+          </a:prstGeom>
+          <a:noFill/>
+        </p:spPr>
+      </p:pic>
+      <p:sp>
+        <p:nvSpPr>
+          <p:cNvPr id="22" name="TextBox 21"/>
+          <p:cNvSpPr txBox="1"/>
+          <p:nvPr/>
+        </p:nvSpPr>
+        <p:spPr>
+          <a:xfrm>
+            <a:off x="838200" y="990600"/>
+            <a:ext cx="2362200" cy="369332"/>
+          </a:xfrm>
+          <a:prstGeom prst="rect">
+            <a:avLst/>
+          </a:prstGeom>
+          <a:noFill/>
+        </p:spPr>
+        <p:txBody>
+          <a:bodyPr wrap="square" rtlCol="0">
             <a:spAutoFit/>
           </a:bodyPr>
           <a:lstStyle/>
           <a:p>
-            <a:pPr lvl="0">
-              <a:spcBef>
-                <a:spcPts val="0"/>
-              </a:spcBef>
-              <a:buNone/>
-            </a:pPr>
-            <a:r>
-              <a:rPr lang="en-US" sz="3600" dirty="0" smtClean="0"/>
-              <a:t>DEMO</a:t>
-            </a:r>
-          </a:p>
-          <a:p>
-            <a:pPr lvl="0">
-              <a:spcBef>
-                <a:spcPts val="0"/>
-              </a:spcBef>
-              <a:buNone/>
-            </a:pPr>
-            <a:endParaRPr lang="en-US" sz="3600" dirty="0" smtClean="0"/>
-          </a:p>
-          <a:p>
-            <a:pPr lvl="0">
-              <a:spcBef>
-                <a:spcPts val="0"/>
-              </a:spcBef>
-              <a:buNone/>
-            </a:pPr>
-            <a:endParaRPr lang="en-US" sz="3600" dirty="0" smtClean="0"/>
-          </a:p>
-          <a:p>
-            <a:pPr lvl="0">
-              <a:spcBef>
-                <a:spcPts val="0"/>
-              </a:spcBef>
-              <a:buNone/>
-            </a:pPr>
-            <a:endParaRPr lang="en-US" dirty="0"/>
-          </a:p>
-          <a:p>
-            <a:pPr lvl="0">
-              <a:spcBef>
-                <a:spcPts val="0"/>
-              </a:spcBef>
-              <a:buFont typeface="Arial" pitchFamily="34" charset="0"/>
-              <a:buChar char="•"/>
-            </a:pPr>
-            <a:endParaRPr lang="en-US" sz="2800" dirty="0" smtClean="0"/>
-          </a:p>
-          <a:p>
-            <a:pPr lvl="0">
-              <a:spcBef>
-                <a:spcPts val="0"/>
-              </a:spcBef>
-            </a:pPr>
-            <a:endParaRPr lang="en-US" dirty="0"/>
-          </a:p>
-          <a:p>
-            <a:pPr lvl="0">
-              <a:spcBef>
-                <a:spcPts val="0"/>
-              </a:spcBef>
-              <a:buNone/>
-            </a:pPr>
-            <a:endParaRPr lang="en-US" dirty="0"/>
+            <a:r>
+              <a:rPr lang="en-US" dirty="0" smtClean="0"/>
+              <a:t>User email validation</a:t>
+            </a:r>
+            <a:endParaRPr lang="en-IN" dirty="0"/>
+          </a:p>
+        </p:txBody>
+      </p:sp>
+      <p:sp>
+        <p:nvSpPr>
+          <p:cNvPr id="24" name="TextBox 23"/>
+          <p:cNvSpPr txBox="1"/>
+          <p:nvPr/>
+        </p:nvSpPr>
+        <p:spPr>
+          <a:xfrm>
+            <a:off x="5943600" y="990600"/>
+            <a:ext cx="2743200" cy="369332"/>
+          </a:xfrm>
+          <a:prstGeom prst="rect">
+            <a:avLst/>
+          </a:prstGeom>
+          <a:noFill/>
+        </p:spPr>
+        <p:txBody>
+          <a:bodyPr wrap="square" rtlCol="0">
+            <a:spAutoFit/>
+          </a:bodyPr>
+          <a:lstStyle/>
+          <a:p>
+            <a:r>
+              <a:rPr lang="en-US" dirty="0" smtClean="0"/>
+              <a:t>      User Registration </a:t>
+            </a:r>
+            <a:endParaRPr lang="en-IN" dirty="0"/>
+          </a:p>
+        </p:txBody>
+      </p:sp>
+    </p:spTree>
+  </p:cSld>
+  <p:clrMapOvr>
+    <a:masterClrMapping/>
+  </p:clrMapOvr>
+</p:sld>
+</file>
+
+<file path=ppt/slides/slide7.xml><?xml version="1.0" encoding="utf-8"?>
+<p:sld xmlns:a="http://schemas.openxmlformats.org/drawingml/2006/main" xmlns:r="http://schemas.openxmlformats.org/officeDocument/2006/relationships" xmlns:p="http://schemas.openxmlformats.org/presentationml/2006/main">
+  <p:cSld>
+    <p:spTree>
+      <p:nvGrpSpPr>
+        <p:cNvPr id="1" name=""/>
+        <p:cNvGrpSpPr/>
+        <p:nvPr/>
+      </p:nvGrpSpPr>
+      <p:grpSpPr>
+        <a:xfrm>
+          <a:off x="0" y="0"/>
+          <a:ext cx="0" cy="0"/>
+          <a:chOff x="0" y="0"/>
+          <a:chExt cx="0" cy="0"/>
+        </a:xfrm>
+      </p:grpSpPr>
+      <p:sp>
+        <p:nvSpPr>
+          <p:cNvPr id="2" name="Title 1"/>
+          <p:cNvSpPr>
+            <a:spLocks noGrp="1"/>
+          </p:cNvSpPr>
+          <p:nvPr>
+            <p:ph type="title"/>
+          </p:nvPr>
+        </p:nvSpPr>
+        <p:spPr>
+          <a:xfrm>
+            <a:off x="457200" y="274638"/>
+            <a:ext cx="8229600" cy="563562"/>
+          </a:xfrm>
+        </p:spPr>
+        <p:txBody>
+          <a:bodyPr>
+            <a:normAutofit fontScale="90000"/>
+          </a:bodyPr>
+          <a:lstStyle/>
+          <a:p>
+            <a:r>
+              <a:rPr lang="en-US" dirty="0" smtClean="0"/>
+              <a:t>CAR POOL</a:t>
+            </a:r>
+            <a:endParaRPr lang="en-IN" dirty="0"/>
+          </a:p>
+        </p:txBody>
+      </p:sp>
+      <p:pic>
+        <p:nvPicPr>
+          <p:cNvPr id="2050" name="Picture 2" descr="C:\Users\sriharsha\Desktop\carpool pics\Screenshot_20160809-031053.png"/>
+          <p:cNvPicPr>
+            <a:picLocks noChangeAspect="1" noChangeArrowheads="1"/>
+          </p:cNvPicPr>
+          <p:nvPr/>
+        </p:nvPicPr>
+        <p:blipFill>
+          <a:blip r:embed="rId2" cstate="print"/>
+          <a:srcRect/>
+          <a:stretch>
+            <a:fillRect/>
+          </a:stretch>
+        </p:blipFill>
+        <p:spPr bwMode="auto">
+          <a:xfrm>
+            <a:off x="1066800" y="1752600"/>
+            <a:ext cx="2590800" cy="4470400"/>
+          </a:xfrm>
+          <a:prstGeom prst="rect">
+            <a:avLst/>
+          </a:prstGeom>
+          <a:noFill/>
+        </p:spPr>
+      </p:pic>
+      <p:pic>
+        <p:nvPicPr>
+          <p:cNvPr id="2051" name="Picture 3" descr="C:\Users\sriharsha\Desktop\carpool pics\Screenshot_20160809-031138.png"/>
+          <p:cNvPicPr>
+            <a:picLocks noChangeAspect="1" noChangeArrowheads="1"/>
+          </p:cNvPicPr>
+          <p:nvPr/>
+        </p:nvPicPr>
+        <p:blipFill>
+          <a:blip r:embed="rId3" cstate="print"/>
+          <a:srcRect/>
+          <a:stretch>
+            <a:fillRect/>
+          </a:stretch>
+        </p:blipFill>
+        <p:spPr bwMode="auto">
+          <a:xfrm>
+            <a:off x="5715000" y="1752600"/>
+            <a:ext cx="2571750" cy="4572000"/>
+          </a:xfrm>
+          <a:prstGeom prst="rect">
+            <a:avLst/>
+          </a:prstGeom>
+          <a:noFill/>
+        </p:spPr>
+      </p:pic>
+      <p:sp>
+        <p:nvSpPr>
+          <p:cNvPr id="5" name="TextBox 4"/>
+          <p:cNvSpPr txBox="1"/>
+          <p:nvPr/>
+        </p:nvSpPr>
+        <p:spPr>
+          <a:xfrm>
+            <a:off x="1143000" y="1295400"/>
+            <a:ext cx="2286000" cy="381000"/>
+          </a:xfrm>
+          <a:prstGeom prst="rect">
+            <a:avLst/>
+          </a:prstGeom>
+          <a:noFill/>
+        </p:spPr>
+        <p:txBody>
+          <a:bodyPr wrap="square" rtlCol="0">
+            <a:spAutoFit/>
+          </a:bodyPr>
+          <a:lstStyle/>
+          <a:p>
+            <a:pPr algn="ctr"/>
+            <a:r>
+              <a:rPr lang="en-US" dirty="0" smtClean="0"/>
+              <a:t>Home Screen</a:t>
+            </a:r>
+            <a:endParaRPr lang="en-IN" dirty="0"/>
+          </a:p>
+        </p:txBody>
+      </p:sp>
+      <p:sp>
+        <p:nvSpPr>
+          <p:cNvPr id="6" name="TextBox 5"/>
+          <p:cNvSpPr txBox="1"/>
+          <p:nvPr/>
+        </p:nvSpPr>
+        <p:spPr>
+          <a:xfrm>
+            <a:off x="5867400" y="1295400"/>
+            <a:ext cx="2286000" cy="369332"/>
+          </a:xfrm>
+          <a:prstGeom prst="rect">
+            <a:avLst/>
+          </a:prstGeom>
+          <a:noFill/>
+        </p:spPr>
+        <p:txBody>
+          <a:bodyPr wrap="square" rtlCol="0">
+            <a:spAutoFit/>
+          </a:bodyPr>
+          <a:lstStyle/>
+          <a:p>
+            <a:pPr algn="ctr"/>
+            <a:r>
+              <a:rPr lang="en-US" dirty="0" smtClean="0"/>
+              <a:t>Offer Ride activity</a:t>
+            </a:r>
+            <a:endParaRPr lang="en-IN" dirty="0"/>
+          </a:p>
+        </p:txBody>
+      </p:sp>
+    </p:spTree>
+  </p:cSld>
+  <p:clrMapOvr>
+    <a:masterClrMapping/>
+  </p:clrMapOvr>
+</p:sld>
+</file>
+
+<file path=ppt/slides/slide8.xml><?xml version="1.0" encoding="utf-8"?>
+<p:sld xmlns:a="http://schemas.openxmlformats.org/drawingml/2006/main" xmlns:r="http://schemas.openxmlformats.org/officeDocument/2006/relationships" xmlns:p="http://schemas.openxmlformats.org/presentationml/2006/main">
+  <p:cSld>
+    <p:spTree>
+      <p:nvGrpSpPr>
+        <p:cNvPr id="1" name=""/>
+        <p:cNvGrpSpPr/>
+        <p:nvPr/>
+      </p:nvGrpSpPr>
+      <p:grpSpPr>
+        <a:xfrm>
+          <a:off x="0" y="0"/>
+          <a:ext cx="0" cy="0"/>
+          <a:chOff x="0" y="0"/>
+          <a:chExt cx="0" cy="0"/>
+        </a:xfrm>
+      </p:grpSpPr>
+      <p:sp>
+        <p:nvSpPr>
+          <p:cNvPr id="2" name="Title 1"/>
+          <p:cNvSpPr>
+            <a:spLocks noGrp="1"/>
+          </p:cNvSpPr>
+          <p:nvPr>
+            <p:ph type="title"/>
+          </p:nvPr>
+        </p:nvSpPr>
+        <p:spPr>
+          <a:xfrm>
+            <a:off x="457200" y="274638"/>
+            <a:ext cx="8229600" cy="792162"/>
+          </a:xfrm>
+        </p:spPr>
+        <p:txBody>
+          <a:bodyPr>
+            <a:normAutofit/>
+          </a:bodyPr>
+          <a:lstStyle/>
+          <a:p>
+            <a:r>
+              <a:rPr lang="en-US" sz="4000" dirty="0" smtClean="0"/>
+              <a:t>CAR POOL</a:t>
+            </a:r>
+            <a:endParaRPr lang="en-IN" sz="4000" dirty="0"/>
+          </a:p>
+        </p:txBody>
+      </p:sp>
+      <p:pic>
+        <p:nvPicPr>
+          <p:cNvPr id="3074" name="Picture 2" descr="C:\Users\sriharsha\Desktop\carpool pics\Screenshot_20160809-031141.png"/>
+          <p:cNvPicPr>
+            <a:picLocks noChangeAspect="1" noChangeArrowheads="1"/>
+          </p:cNvPicPr>
+          <p:nvPr/>
+        </p:nvPicPr>
+        <p:blipFill>
+          <a:blip r:embed="rId2" cstate="print"/>
+          <a:srcRect/>
+          <a:stretch>
+            <a:fillRect/>
+          </a:stretch>
+        </p:blipFill>
+        <p:spPr bwMode="auto">
+          <a:xfrm>
+            <a:off x="1143000" y="1752600"/>
+            <a:ext cx="2571750" cy="4572000"/>
+          </a:xfrm>
+          <a:prstGeom prst="rect">
+            <a:avLst/>
+          </a:prstGeom>
+          <a:noFill/>
+        </p:spPr>
+      </p:pic>
+      <p:pic>
+        <p:nvPicPr>
+          <p:cNvPr id="3075" name="Picture 3" descr="C:\Users\sriharsha\Desktop\carpool pics\Screenshot_20160809-031150.png"/>
+          <p:cNvPicPr>
+            <a:picLocks noChangeAspect="1" noChangeArrowheads="1"/>
+          </p:cNvPicPr>
+          <p:nvPr/>
+        </p:nvPicPr>
+        <p:blipFill>
+          <a:blip r:embed="rId3" cstate="print"/>
+          <a:srcRect/>
+          <a:stretch>
+            <a:fillRect/>
+          </a:stretch>
+        </p:blipFill>
+        <p:spPr bwMode="auto">
+          <a:xfrm>
+            <a:off x="5562600" y="1752600"/>
+            <a:ext cx="2571750" cy="4572000"/>
+          </a:xfrm>
+          <a:prstGeom prst="rect">
+            <a:avLst/>
+          </a:prstGeom>
+          <a:noFill/>
+        </p:spPr>
+      </p:pic>
+      <p:sp>
+        <p:nvSpPr>
+          <p:cNvPr id="5" name="TextBox 4"/>
+          <p:cNvSpPr txBox="1"/>
+          <p:nvPr/>
+        </p:nvSpPr>
+        <p:spPr>
+          <a:xfrm>
+            <a:off x="1295400" y="1371600"/>
+            <a:ext cx="2286000" cy="369332"/>
+          </a:xfrm>
+          <a:prstGeom prst="rect">
+            <a:avLst/>
+          </a:prstGeom>
+          <a:noFill/>
+        </p:spPr>
+        <p:txBody>
+          <a:bodyPr wrap="square" rtlCol="0">
+            <a:spAutoFit/>
+          </a:bodyPr>
+          <a:lstStyle/>
+          <a:p>
+            <a:pPr algn="ctr"/>
+            <a:r>
+              <a:rPr lang="en-US" dirty="0" smtClean="0"/>
+              <a:t>Home Screen</a:t>
+            </a:r>
+            <a:endParaRPr lang="en-IN" dirty="0"/>
+          </a:p>
+        </p:txBody>
+      </p:sp>
+      <p:sp>
+        <p:nvSpPr>
+          <p:cNvPr id="6" name="TextBox 5"/>
+          <p:cNvSpPr txBox="1"/>
+          <p:nvPr/>
+        </p:nvSpPr>
+        <p:spPr>
+          <a:xfrm>
+            <a:off x="5410200" y="1371600"/>
+            <a:ext cx="2971800" cy="369332"/>
+          </a:xfrm>
+          <a:prstGeom prst="rect">
+            <a:avLst/>
+          </a:prstGeom>
+          <a:noFill/>
+        </p:spPr>
+        <p:txBody>
+          <a:bodyPr wrap="square" rtlCol="0">
+            <a:spAutoFit/>
+          </a:bodyPr>
+          <a:lstStyle/>
+          <a:p>
+            <a:pPr algn="ctr"/>
+            <a:r>
+              <a:rPr lang="en-US" dirty="0" smtClean="0"/>
+              <a:t>Update Profile activity</a:t>
+            </a:r>
+            <a:endParaRPr lang="en-IN" dirty="0"/>
+          </a:p>
+        </p:txBody>
+      </p:sp>
+    </p:spTree>
+  </p:cSld>
+  <p:clrMapOvr>
+    <a:masterClrMapping/>
+  </p:clrMapOvr>
+</p:sld>
+</file>
+
+<file path=ppt/slides/slide9.xml><?xml version="1.0" encoding="utf-8"?>
+<p:sld xmlns:a="http://schemas.openxmlformats.org/drawingml/2006/main" xmlns:r="http://schemas.openxmlformats.org/officeDocument/2006/relationships" xmlns:p="http://schemas.openxmlformats.org/presentationml/2006/main">
+  <p:cSld>
+    <p:spTree>
+      <p:nvGrpSpPr>
+        <p:cNvPr id="1" name=""/>
+        <p:cNvGrpSpPr/>
+        <p:nvPr/>
+      </p:nvGrpSpPr>
+      <p:grpSpPr>
+        <a:xfrm>
+          <a:off x="0" y="0"/>
+          <a:ext cx="0" cy="0"/>
+          <a:chOff x="0" y="0"/>
+          <a:chExt cx="0" cy="0"/>
+        </a:xfrm>
+      </p:grpSpPr>
+      <p:sp>
+        <p:nvSpPr>
+          <p:cNvPr id="2" name="Title 1"/>
+          <p:cNvSpPr>
+            <a:spLocks noGrp="1"/>
+          </p:cNvSpPr>
+          <p:nvPr>
+            <p:ph type="title"/>
+          </p:nvPr>
+        </p:nvSpPr>
+        <p:spPr>
+          <a:xfrm>
+            <a:off x="457200" y="274638"/>
+            <a:ext cx="8229600" cy="715962"/>
+          </a:xfrm>
+        </p:spPr>
+        <p:txBody>
+          <a:bodyPr>
+            <a:normAutofit/>
+          </a:bodyPr>
+          <a:lstStyle/>
+          <a:p>
+            <a:r>
+              <a:rPr lang="en-US" sz="4000" dirty="0" smtClean="0"/>
+              <a:t>CAR POOL</a:t>
+            </a:r>
+            <a:endParaRPr lang="en-IN" sz="4000" dirty="0"/>
+          </a:p>
+        </p:txBody>
+      </p:sp>
+      <p:pic>
+        <p:nvPicPr>
+          <p:cNvPr id="4098" name="Picture 2" descr="C:\Users\sriharsha\Desktop\carpool pics\Screenshot_20160809-031209.png"/>
+          <p:cNvPicPr>
+            <a:picLocks noChangeAspect="1" noChangeArrowheads="1"/>
+          </p:cNvPicPr>
+          <p:nvPr/>
+        </p:nvPicPr>
+        <p:blipFill>
+          <a:blip r:embed="rId2" cstate="print"/>
+          <a:srcRect/>
+          <a:stretch>
+            <a:fillRect/>
+          </a:stretch>
+        </p:blipFill>
+        <p:spPr bwMode="auto">
+          <a:xfrm>
+            <a:off x="3276600" y="1676400"/>
+            <a:ext cx="2590800" cy="4605866"/>
+          </a:xfrm>
+          <a:prstGeom prst="rect">
+            <a:avLst/>
+          </a:prstGeom>
+          <a:noFill/>
+        </p:spPr>
+      </p:pic>
+      <p:pic>
+        <p:nvPicPr>
+          <p:cNvPr id="4099" name="Picture 3" descr="C:\Users\sriharsha\Desktop\carpool pics\Screenshot_20160809-031227.png"/>
+          <p:cNvPicPr>
+            <a:picLocks noChangeAspect="1" noChangeArrowheads="1"/>
+          </p:cNvPicPr>
+          <p:nvPr/>
+        </p:nvPicPr>
+        <p:blipFill>
+          <a:blip r:embed="rId3" cstate="print"/>
+          <a:srcRect/>
+          <a:stretch>
+            <a:fillRect/>
+          </a:stretch>
+        </p:blipFill>
+        <p:spPr bwMode="auto">
+          <a:xfrm>
+            <a:off x="6248400" y="1676400"/>
+            <a:ext cx="2614613" cy="4648200"/>
+          </a:xfrm>
+          <a:prstGeom prst="rect">
+            <a:avLst/>
+          </a:prstGeom>
+          <a:noFill/>
+        </p:spPr>
+      </p:pic>
+      <p:pic>
+        <p:nvPicPr>
+          <p:cNvPr id="5" name="Picture 2" descr="C:\Users\sriharsha\Desktop\carpool pics\Screenshot_20160809-031053.png"/>
+          <p:cNvPicPr>
+            <a:picLocks noChangeAspect="1" noChangeArrowheads="1"/>
+          </p:cNvPicPr>
+          <p:nvPr/>
+        </p:nvPicPr>
+        <p:blipFill>
+          <a:blip r:embed="rId4" cstate="print"/>
+          <a:srcRect/>
+          <a:stretch>
+            <a:fillRect/>
+          </a:stretch>
+        </p:blipFill>
+        <p:spPr bwMode="auto">
+          <a:xfrm>
+            <a:off x="152400" y="1676400"/>
+            <a:ext cx="2649682" cy="4572000"/>
+          </a:xfrm>
+          <a:prstGeom prst="rect">
+            <a:avLst/>
+          </a:prstGeom>
+          <a:noFill/>
+        </p:spPr>
+      </p:pic>
+      <p:sp>
+        <p:nvSpPr>
+          <p:cNvPr id="6" name="TextBox 5"/>
+          <p:cNvSpPr txBox="1"/>
+          <p:nvPr/>
+        </p:nvSpPr>
+        <p:spPr>
+          <a:xfrm>
+            <a:off x="381000" y="1295400"/>
+            <a:ext cx="2057400" cy="369332"/>
+          </a:xfrm>
+          <a:prstGeom prst="rect">
+            <a:avLst/>
+          </a:prstGeom>
+          <a:noFill/>
+        </p:spPr>
+        <p:txBody>
+          <a:bodyPr wrap="square" rtlCol="0">
+            <a:spAutoFit/>
+          </a:bodyPr>
+          <a:lstStyle/>
+          <a:p>
+            <a:pPr algn="ctr"/>
+            <a:r>
+              <a:rPr lang="en-US" dirty="0" smtClean="0"/>
+              <a:t>Home Screen</a:t>
+            </a:r>
+            <a:endParaRPr lang="en-IN" dirty="0"/>
+          </a:p>
+        </p:txBody>
+      </p:sp>
+      <p:sp>
+        <p:nvSpPr>
+          <p:cNvPr id="7" name="TextBox 6"/>
+          <p:cNvSpPr txBox="1"/>
+          <p:nvPr/>
+        </p:nvSpPr>
+        <p:spPr>
+          <a:xfrm>
+            <a:off x="3505200" y="1295400"/>
+            <a:ext cx="2133600" cy="381000"/>
+          </a:xfrm>
+          <a:prstGeom prst="rect">
+            <a:avLst/>
+          </a:prstGeom>
+          <a:noFill/>
+        </p:spPr>
+        <p:txBody>
+          <a:bodyPr wrap="square" rtlCol="0">
+            <a:spAutoFit/>
+          </a:bodyPr>
+          <a:lstStyle/>
+          <a:p>
+            <a:r>
+              <a:rPr lang="en-US" dirty="0" smtClean="0"/>
+              <a:t>Search Ride Activity</a:t>
+            </a:r>
+            <a:endParaRPr lang="en-IN" dirty="0"/>
+          </a:p>
+        </p:txBody>
+      </p:sp>
+      <p:sp>
+        <p:nvSpPr>
+          <p:cNvPr id="8" name="TextBox 7"/>
+          <p:cNvSpPr txBox="1"/>
+          <p:nvPr/>
+        </p:nvSpPr>
+        <p:spPr>
+          <a:xfrm>
+            <a:off x="6400800" y="1295400"/>
+            <a:ext cx="2286000" cy="381000"/>
+          </a:xfrm>
+          <a:prstGeom prst="rect">
+            <a:avLst/>
+          </a:prstGeom>
+          <a:noFill/>
+        </p:spPr>
+        <p:txBody>
+          <a:bodyPr wrap="square" rtlCol="0">
+            <a:spAutoFit/>
+          </a:bodyPr>
+          <a:lstStyle/>
+          <a:p>
+            <a:r>
+              <a:rPr lang="en-US" dirty="0" smtClean="0"/>
+              <a:t>   Search </a:t>
+            </a:r>
+            <a:r>
+              <a:rPr lang="en-US" dirty="0" smtClean="0"/>
+              <a:t>Ride Activity</a:t>
+            </a:r>
+            <a:endParaRPr lang="en-IN" dirty="0"/>
           </a:p>
         </p:txBody>
       </p:sp>

</xml_diff>